<commit_message>
Update presentation in pdf version
</commit_message>
<xml_diff>
--- a/presentation/BirdSong_20180903_lit-review.pptx
+++ b/presentation/BirdSong_20180903_lit-review.pptx
@@ -321,7 +321,7 @@
             <a:fld id="{5586B75A-687E-405C-8A0B-8D00578BA2C3}" type="datetimeFigureOut">
               <a:rPr lang="en-US" smtClean="0"/>
               <a:pPr/>
-              <a:t>9/3/2018</a:t>
+              <a:t>1/23/2019</a:t>
             </a:fld>
             <a:endParaRPr lang="en-US" dirty="0"/>
           </a:p>
@@ -528,7 +528,7 @@
             <a:fld id="{5586B75A-687E-405C-8A0B-8D00578BA2C3}" type="datetimeFigureOut">
               <a:rPr lang="en-US" smtClean="0"/>
               <a:pPr/>
-              <a:t>9/3/2018</a:t>
+              <a:t>1/23/2019</a:t>
             </a:fld>
             <a:endParaRPr lang="en-US" dirty="0"/>
           </a:p>
@@ -710,7 +710,7 @@
             <a:fld id="{5586B75A-687E-405C-8A0B-8D00578BA2C3}" type="datetimeFigureOut">
               <a:rPr lang="en-US" smtClean="0"/>
               <a:pPr/>
-              <a:t>9/3/2018</a:t>
+              <a:t>1/23/2019</a:t>
             </a:fld>
             <a:endParaRPr lang="en-US" dirty="0"/>
           </a:p>
@@ -917,7 +917,7 @@
             <a:fld id="{5586B75A-687E-405C-8A0B-8D00578BA2C3}" type="datetimeFigureOut">
               <a:rPr lang="en-US" smtClean="0"/>
               <a:pPr/>
-              <a:t>9/3/2018</a:t>
+              <a:t>1/23/2019</a:t>
             </a:fld>
             <a:endParaRPr lang="en-US" dirty="0"/>
           </a:p>
@@ -1214,7 +1214,7 @@
             <a:fld id="{5586B75A-687E-405C-8A0B-8D00578BA2C3}" type="datetimeFigureOut">
               <a:rPr lang="en-US" smtClean="0"/>
               <a:pPr/>
-              <a:t>9/3/2018</a:t>
+              <a:t>1/23/2019</a:t>
             </a:fld>
             <a:endParaRPr lang="en-US" dirty="0"/>
           </a:p>
@@ -1488,7 +1488,7 @@
             <a:fld id="{5586B75A-687E-405C-8A0B-8D00578BA2C3}" type="datetimeFigureOut">
               <a:rPr lang="en-US" smtClean="0"/>
               <a:pPr/>
-              <a:t>9/3/2018</a:t>
+              <a:t>1/23/2019</a:t>
             </a:fld>
             <a:endParaRPr lang="en-US" dirty="0"/>
           </a:p>
@@ -1897,7 +1897,7 @@
             <a:fld id="{5586B75A-687E-405C-8A0B-8D00578BA2C3}" type="datetimeFigureOut">
               <a:rPr lang="en-US" smtClean="0"/>
               <a:pPr/>
-              <a:t>9/3/2018</a:t>
+              <a:t>1/23/2019</a:t>
             </a:fld>
             <a:endParaRPr lang="en-US" dirty="0"/>
           </a:p>
@@ -2017,7 +2017,7 @@
             <a:fld id="{5586B75A-687E-405C-8A0B-8D00578BA2C3}" type="datetimeFigureOut">
               <a:rPr lang="en-US" smtClean="0"/>
               <a:pPr/>
-              <a:t>9/3/2018</a:t>
+              <a:t>1/23/2019</a:t>
             </a:fld>
             <a:endParaRPr lang="en-US" dirty="0"/>
           </a:p>
@@ -2114,7 +2114,7 @@
             <a:fld id="{5586B75A-687E-405C-8A0B-8D00578BA2C3}" type="datetimeFigureOut">
               <a:rPr lang="en-US" smtClean="0"/>
               <a:pPr/>
-              <a:t>9/3/2018</a:t>
+              <a:t>1/23/2019</a:t>
             </a:fld>
             <a:endParaRPr lang="en-US" dirty="0"/>
           </a:p>
@@ -2406,7 +2406,7 @@
             <a:fld id="{5586B75A-687E-405C-8A0B-8D00578BA2C3}" type="datetimeFigureOut">
               <a:rPr lang="en-US" smtClean="0"/>
               <a:pPr/>
-              <a:t>9/3/2018</a:t>
+              <a:t>1/23/2019</a:t>
             </a:fld>
             <a:endParaRPr lang="en-US" dirty="0"/>
           </a:p>
@@ -2688,7 +2688,7 @@
             <a:fld id="{5586B75A-687E-405C-8A0B-8D00578BA2C3}" type="datetimeFigureOut">
               <a:rPr lang="en-US" smtClean="0"/>
               <a:pPr/>
-              <a:t>9/3/2018</a:t>
+              <a:t>1/23/2019</a:t>
             </a:fld>
             <a:endParaRPr lang="en-US" dirty="0"/>
           </a:p>
@@ -2940,7 +2940,7 @@
             <a:fld id="{5586B75A-687E-405C-8A0B-8D00578BA2C3}" type="datetimeFigureOut">
               <a:rPr lang="en-US" smtClean="0"/>
               <a:pPr/>
-              <a:t>9/3/2018</a:t>
+              <a:t>1/23/2019</a:t>
             </a:fld>
             <a:endParaRPr lang="en-US" dirty="0"/>
           </a:p>
@@ -5695,15 +5695,7 @@
             </a:r>
             <a:r>
               <a:rPr lang="en-US" sz="2400" dirty="0"/>
-              <a:t> MFCC &amp; SVM for bird song </a:t>
-            </a:r>
-            <a:r>
-              <a:rPr lang="en-US" sz="2400" dirty="0" err="1"/>
-              <a:t>idenfication</a:t>
-            </a:r>
-            <a:r>
-              <a:rPr lang="en-US" sz="2400" dirty="0"/>
-              <a:t> (Olivier, 2013)</a:t>
+              <a:t> MFCC &amp; SVM for bird song identification (Olivier, 2013)</a:t>
             </a:r>
             <a:endParaRPr lang="en-US" sz="2400" dirty="0">
               <a:solidFill>

</xml_diff>